<commit_message>
Update Präsentation - Kopie - Kopie.pptx
</commit_message>
<xml_diff>
--- a/Writing/Präsentation - Kopie - Kopie.pptx
+++ b/Writing/Präsentation - Kopie - Kopie.pptx
@@ -538,7 +538,7 @@
               <a:pPr>
                 <a:defRPr/>
               </a:pPr>
-              <a:t>‹#›</a:t>
+              <a:t>‹Nr.›</a:t>
             </a:fld>
             <a:endParaRPr lang="de-DE"/>
           </a:p>
@@ -957,7 +957,7 @@
               <a:pPr algn="l" rtl="0">
                 <a:defRPr/>
               </a:pPr>
-              <a:t>‹#›</a:t>
+              <a:t>‹Nr.›</a:t>
             </a:fld>
             <a:endParaRPr lang="en-GB"/>
           </a:p>
@@ -2329,6 +2329,22 @@
           <a:bodyPr/>
           <a:lstStyle/>
           <a:p>
+            <a:r>
+              <a:rPr lang="de-DE" dirty="0"/>
+              <a:t>End </a:t>
+            </a:r>
+            <a:r>
+              <a:rPr lang="de-DE" dirty="0" err="1"/>
+              <a:t>around</a:t>
+            </a:r>
+            <a:r>
+              <a:rPr lang="de-DE" dirty="0"/>
+              <a:t> 2 </a:t>
+            </a:r>
+            <a:r>
+              <a:rPr lang="de-DE" dirty="0" err="1"/>
+              <a:t>minds</a:t>
+            </a:r>
             <a:endParaRPr lang="de-DE" dirty="0"/>
           </a:p>
         </p:txBody>
@@ -2999,7 +3015,7 @@
             </a:r>
             <a:r>
               <a:rPr lang="de-DE" dirty="0"/>
-              <a:t> prompt</a:t>
+              <a:t> prompt   END AT 5 MINS</a:t>
             </a:r>
           </a:p>
         </p:txBody>
@@ -3639,7 +3655,7 @@
             <a:fld id="{78742581-81B1-425F-B25E-3CD197136A05}" type="slidenum">
               <a:rPr lang="en-GB" smtClean="0"/>
               <a:pPr algn="l" rtl="0"/>
-              <a:t>‹#›</a:t>
+              <a:t>‹Nr.›</a:t>
             </a:fld>
             <a:endParaRPr lang="en-GB" dirty="0"/>
           </a:p>
@@ -4151,7 +4167,7 @@
             <a:fld id="{78742581-81B1-425F-B25E-3CD197136A05}" type="slidenum">
               <a:rPr lang="en-GB" smtClean="0"/>
               <a:pPr algn="l" rtl="0"/>
-              <a:t>‹#›</a:t>
+              <a:t>‹Nr.›</a:t>
             </a:fld>
             <a:endParaRPr lang="en-GB" dirty="0"/>
           </a:p>
@@ -4663,7 +4679,7 @@
             <a:fld id="{78742581-81B1-425F-B25E-3CD197136A05}" type="slidenum">
               <a:rPr lang="en-GB" smtClean="0"/>
               <a:pPr algn="l" rtl="0"/>
-              <a:t>‹#›</a:t>
+              <a:t>‹Nr.›</a:t>
             </a:fld>
             <a:endParaRPr lang="en-GB" dirty="0"/>
           </a:p>
@@ -4988,7 +5004,7 @@
             <a:fld id="{78742581-81B1-425F-B25E-3CD197136A05}" type="slidenum">
               <a:rPr lang="en-GB" smtClean="0"/>
               <a:pPr algn="l" rtl="0"/>
-              <a:t>‹#›</a:t>
+              <a:t>‹Nr.›</a:t>
             </a:fld>
             <a:endParaRPr lang="en-GB" dirty="0"/>
           </a:p>
@@ -5456,7 +5472,7 @@
             <a:fld id="{78742581-81B1-425F-B25E-3CD197136A05}" type="slidenum">
               <a:rPr lang="en-GB" smtClean="0"/>
               <a:pPr algn="l" rtl="0"/>
-              <a:t>‹#›</a:t>
+              <a:t>‹Nr.›</a:t>
             </a:fld>
             <a:endParaRPr lang="en-GB" dirty="0"/>
           </a:p>
@@ -5740,7 +5756,7 @@
             <a:fld id="{78742581-81B1-425F-B25E-3CD197136A05}" type="slidenum">
               <a:rPr lang="en-GB" smtClean="0"/>
               <a:pPr algn="l" rtl="0"/>
-              <a:t>‹#›</a:t>
+              <a:t>‹Nr.›</a:t>
             </a:fld>
             <a:endParaRPr lang="en-GB" dirty="0"/>
           </a:p>
@@ -6098,7 +6114,7 @@
             <a:fld id="{78742581-81B1-425F-B25E-3CD197136A05}" type="slidenum">
               <a:rPr lang="en-GB" smtClean="0"/>
               <a:pPr algn="l" rtl="0"/>
-              <a:t>‹#›</a:t>
+              <a:t>‹Nr.›</a:t>
             </a:fld>
             <a:endParaRPr lang="en-GB" dirty="0"/>
           </a:p>
@@ -6493,7 +6509,7 @@
             <a:fld id="{78742581-81B1-425F-B25E-3CD197136A05}" type="slidenum">
               <a:rPr lang="en-GB" smtClean="0"/>
               <a:pPr algn="l" rtl="0"/>
-              <a:t>‹#›</a:t>
+              <a:t>‹Nr.›</a:t>
             </a:fld>
             <a:endParaRPr lang="en-GB" dirty="0"/>
           </a:p>
@@ -6881,7 +6897,7 @@
             <a:fld id="{78742581-81B1-425F-B25E-3CD197136A05}" type="slidenum">
               <a:rPr lang="en-GB" smtClean="0"/>
               <a:pPr algn="l" rtl="0"/>
-              <a:t>‹#›</a:t>
+              <a:t>‹Nr.›</a:t>
             </a:fld>
             <a:endParaRPr lang="en-GB" dirty="0"/>
           </a:p>
@@ -7276,7 +7292,7 @@
             <a:fld id="{78742581-81B1-425F-B25E-3CD197136A05}" type="slidenum">
               <a:rPr lang="en-GB" smtClean="0"/>
               <a:pPr algn="l" rtl="0"/>
-              <a:t>‹#›</a:t>
+              <a:t>‹Nr.›</a:t>
             </a:fld>
             <a:endParaRPr lang="en-GB" dirty="0"/>
           </a:p>
@@ -7627,7 +7643,7 @@
             <a:fld id="{78742581-81B1-425F-B25E-3CD197136A05}" type="slidenum">
               <a:rPr lang="en-GB" smtClean="0"/>
               <a:pPr algn="l" rtl="0"/>
-              <a:t>‹#›</a:t>
+              <a:t>‹Nr.›</a:t>
             </a:fld>
             <a:endParaRPr lang="en-GB" dirty="0"/>
           </a:p>
@@ -8068,7 +8084,7 @@
             <a:fld id="{78742581-81B1-425F-B25E-3CD197136A05}" type="slidenum">
               <a:rPr lang="en-GB" smtClean="0"/>
               <a:pPr algn="l" rtl="0"/>
-              <a:t>‹#›</a:t>
+              <a:t>‹Nr.›</a:t>
             </a:fld>
             <a:endParaRPr lang="en-GB" dirty="0"/>
           </a:p>
@@ -8463,7 +8479,7 @@
             <a:fld id="{78742581-81B1-425F-B25E-3CD197136A05}" type="slidenum">
               <a:rPr lang="en-GB" smtClean="0"/>
               <a:pPr algn="l" rtl="0"/>
-              <a:t>‹#›</a:t>
+              <a:t>‹Nr.›</a:t>
             </a:fld>
             <a:endParaRPr lang="en-GB" dirty="0"/>
           </a:p>
@@ -8870,7 +8886,7 @@
             <a:fld id="{78742581-81B1-425F-B25E-3CD197136A05}" type="slidenum">
               <a:rPr lang="en-GB" smtClean="0"/>
               <a:pPr algn="l" rtl="0"/>
-              <a:t>‹#›</a:t>
+              <a:t>‹Nr.›</a:t>
             </a:fld>
             <a:endParaRPr lang="en-GB" dirty="0"/>
           </a:p>
@@ -9336,7 +9352,7 @@
             <a:fld id="{78742581-81B1-425F-B25E-3CD197136A05}" type="slidenum">
               <a:rPr lang="en-GB" smtClean="0"/>
               <a:pPr algn="l" rtl="0"/>
-              <a:t>‹#›</a:t>
+              <a:t>‹Nr.›</a:t>
             </a:fld>
             <a:endParaRPr lang="en-GB" dirty="0"/>
           </a:p>
@@ -10237,7 +10253,7 @@
             <a:fld id="{78742581-81B1-425F-B25E-3CD197136A05}" type="slidenum">
               <a:rPr lang="en-GB" smtClean="0"/>
               <a:pPr algn="l" rtl="0"/>
-              <a:t>‹#›</a:t>
+              <a:t>‹Nr.›</a:t>
             </a:fld>
             <a:endParaRPr lang="en-GB" dirty="0"/>
           </a:p>
@@ -10672,7 +10688,7 @@
             <a:fld id="{78742581-81B1-425F-B25E-3CD197136A05}" type="slidenum">
               <a:rPr lang="en-GB" smtClean="0"/>
               <a:pPr algn="l" rtl="0"/>
-              <a:t>‹#›</a:t>
+              <a:t>‹Nr.›</a:t>
             </a:fld>
             <a:endParaRPr lang="en-GB" dirty="0"/>
           </a:p>
@@ -11215,7 +11231,7 @@
             <a:fld id="{78742581-81B1-425F-B25E-3CD197136A05}" type="slidenum">
               <a:rPr lang="en-GB" smtClean="0"/>
               <a:pPr algn="l" rtl="0"/>
-              <a:t>‹#›</a:t>
+              <a:t>‹Nr.›</a:t>
             </a:fld>
             <a:endParaRPr lang="en-GB" dirty="0"/>
           </a:p>
@@ -11790,7 +11806,7 @@
             <a:fld id="{78742581-81B1-425F-B25E-3CD197136A05}" type="slidenum">
               <a:rPr lang="en-GB" smtClean="0"/>
               <a:pPr algn="l" rtl="0"/>
-              <a:t>‹#›</a:t>
+              <a:t>‹Nr.›</a:t>
             </a:fld>
             <a:endParaRPr lang="en-GB" dirty="0"/>
           </a:p>
@@ -12365,7 +12381,7 @@
             <a:fld id="{78742581-81B1-425F-B25E-3CD197136A05}" type="slidenum">
               <a:rPr lang="en-GB" smtClean="0"/>
               <a:pPr algn="l" rtl="0"/>
-              <a:t>‹#›</a:t>
+              <a:t>‹Nr.›</a:t>
             </a:fld>
             <a:endParaRPr lang="en-GB" dirty="0"/>
           </a:p>
@@ -12654,7 +12670,7 @@
             <a:fld id="{78742581-81B1-425F-B25E-3CD197136A05}" type="slidenum">
               <a:rPr/>
               <a:pPr algn="l" rtl="0"/>
-              <a:t>‹#›</a:t>
+              <a:t>‹Nr.›</a:t>
             </a:fld>
             <a:endParaRPr lang="en-GB" dirty="0"/>
           </a:p>

</xml_diff>